<commit_message>
progress bar and deconv simulation
</commit_message>
<xml_diff>
--- a/output/slides/slides_5-26.pptx
+++ b/output/slides/slides_5-26.pptx
@@ -5,11 +5,12 @@
     <p:sldMasterId id="2147483648" r:id="rId1"/>
   </p:sldMasterIdLst>
   <p:notesMasterIdLst>
-    <p:notesMasterId r:id="rId4"/>
+    <p:notesMasterId r:id="rId5"/>
   </p:notesMasterIdLst>
   <p:sldIdLst>
     <p:sldId id="256" r:id="rId2"/>
     <p:sldId id="257" r:id="rId3"/>
+    <p:sldId id="258" r:id="rId4"/>
   </p:sldIdLst>
   <p:sldSz cx="12192000" cy="6858000"/>
   <p:notesSz cx="6858000" cy="9144000"/>
@@ -108,6 +109,11 @@
       </a:defRPr>
     </a:lvl9pPr>
   </p:defaultTextStyle>
+  <p:extLst>
+    <p:ext uri="{EFAFB233-063F-42B5-8137-9DF3F51BA10A}">
+      <p15:sldGuideLst xmlns:p15="http://schemas.microsoft.com/office/powerpoint/2012/main"/>
+    </p:ext>
+  </p:extLst>
 </p:presentation>
 </file>
 
@@ -4264,6 +4270,319 @@
     <p:extLst>
       <p:ext uri="{BB962C8B-B14F-4D97-AF65-F5344CB8AC3E}">
         <p14:creationId xmlns:p14="http://schemas.microsoft.com/office/powerpoint/2010/main" val="1287662454"/>
+      </p:ext>
+    </p:extLst>
+  </p:cSld>
+  <p:clrMapOvr>
+    <a:masterClrMapping/>
+  </p:clrMapOvr>
+</p:sld>
+</file>
+
+<file path=ppt/slides/slide3.xml><?xml version="1.0" encoding="utf-8"?>
+<p:sld xmlns:a="http://schemas.openxmlformats.org/drawingml/2006/main" xmlns:r="http://schemas.openxmlformats.org/officeDocument/2006/relationships" xmlns:p="http://schemas.openxmlformats.org/presentationml/2006/main">
+  <p:cSld>
+    <p:spTree>
+      <p:nvGrpSpPr>
+        <p:cNvPr id="1" name=""/>
+        <p:cNvGrpSpPr/>
+        <p:nvPr/>
+      </p:nvGrpSpPr>
+      <p:grpSpPr>
+        <a:xfrm>
+          <a:off x="0" y="0"/>
+          <a:ext cx="0" cy="0"/>
+          <a:chOff x="0" y="0"/>
+          <a:chExt cx="0" cy="0"/>
+        </a:xfrm>
+      </p:grpSpPr>
+      <p:sp>
+        <p:nvSpPr>
+          <p:cNvPr id="2" name="Title 1">
+            <a:extLst>
+              <a:ext uri="{FF2B5EF4-FFF2-40B4-BE49-F238E27FC236}">
+                <a16:creationId xmlns:a16="http://schemas.microsoft.com/office/drawing/2014/main" id="{BD27859D-42EB-4AA0-BF0D-DBE7CE003916}"/>
+              </a:ext>
+            </a:extLst>
+          </p:cNvPr>
+          <p:cNvSpPr>
+            <a:spLocks noGrp="1"/>
+          </p:cNvSpPr>
+          <p:nvPr>
+            <p:ph type="title"/>
+          </p:nvPr>
+        </p:nvSpPr>
+        <p:spPr/>
+        <p:txBody>
+          <a:bodyPr/>
+          <a:lstStyle/>
+          <a:p>
+            <a:r>
+              <a:rPr lang="en-US" dirty="0"/>
+              <a:t>Simulation 1</a:t>
+            </a:r>
+          </a:p>
+        </p:txBody>
+      </p:sp>
+      <mc:AlternateContent xmlns:mc="http://schemas.openxmlformats.org/markup-compatibility/2006">
+        <mc:Choice xmlns:a14="http://schemas.microsoft.com/office/drawing/2010/main" Requires="a14">
+          <p:sp>
+            <p:nvSpPr>
+              <p:cNvPr id="3" name="Content Placeholder 2">
+                <a:extLst>
+                  <a:ext uri="{FF2B5EF4-FFF2-40B4-BE49-F238E27FC236}">
+                    <a16:creationId xmlns:a16="http://schemas.microsoft.com/office/drawing/2014/main" id="{4C77F845-D718-4F68-9FDB-CD563FFA9C0F}"/>
+                  </a:ext>
+                </a:extLst>
+              </p:cNvPr>
+              <p:cNvSpPr>
+                <a:spLocks noGrp="1"/>
+              </p:cNvSpPr>
+              <p:nvPr>
+                <p:ph idx="1"/>
+              </p:nvPr>
+            </p:nvSpPr>
+            <p:spPr/>
+            <p:txBody>
+              <a:bodyPr/>
+              <a:lstStyle/>
+              <a:p>
+                <a:pPr marL="514350" indent="-514350">
+                  <a:buFont typeface="+mj-lt"/>
+                  <a:buAutoNum type="arabicPeriod"/>
+                </a:pPr>
+                <a:r>
+                  <a:rPr lang="en-US" dirty="0"/>
+                  <a:t>Run deconvolution on PCs from sample 151673</a:t>
+                </a:r>
+              </a:p>
+              <a:p>
+                <a:pPr marL="514350" indent="-514350">
+                  <a:buFont typeface="+mj-lt"/>
+                  <a:buAutoNum type="arabicPeriod"/>
+                </a:pPr>
+                <a:r>
+                  <a:rPr lang="en-US" dirty="0"/>
+                  <a:t>Given estimated </a:t>
+                </a:r>
+                <a14:m>
+                  <m:oMath xmlns:m="http://schemas.openxmlformats.org/officeDocument/2006/math">
+                    <m:r>
+                      <a:rPr lang="en-US" b="0" i="1" smtClean="0">
+                        <a:latin typeface="Cambria Math" panose="02040503050406030204" pitchFamily="18" charset="0"/>
+                      </a:rPr>
+                      <m:t>𝜇</m:t>
+                    </m:r>
+                    <m:r>
+                      <a:rPr lang="en-US" b="0" i="1" smtClean="0">
+                        <a:latin typeface="Cambria Math" panose="02040503050406030204" pitchFamily="18" charset="0"/>
+                      </a:rPr>
+                      <m:t>,</m:t>
+                    </m:r>
+                    <m:r>
+                      <m:rPr>
+                        <m:sty m:val="p"/>
+                      </m:rPr>
+                      <a:rPr lang="en-US" b="0" i="0" smtClean="0">
+                        <a:latin typeface="Cambria Math" panose="02040503050406030204" pitchFamily="18" charset="0"/>
+                      </a:rPr>
+                      <m:t>Λ</m:t>
+                    </m:r>
+                    <m:r>
+                      <a:rPr lang="en-US" b="0" i="1" smtClean="0">
+                        <a:latin typeface="Cambria Math" panose="02040503050406030204" pitchFamily="18" charset="0"/>
+                      </a:rPr>
+                      <m:t>,</m:t>
+                    </m:r>
+                    <m:r>
+                      <a:rPr lang="en-US" b="0" i="1" smtClean="0">
+                        <a:latin typeface="Cambria Math" panose="02040503050406030204" pitchFamily="18" charset="0"/>
+                      </a:rPr>
+                      <m:t>𝑧</m:t>
+                    </m:r>
+                  </m:oMath>
+                </a14:m>
+                <a:r>
+                  <a:rPr lang="en-US" dirty="0"/>
+                  <a:t>, simulate </a:t>
+                </a:r>
+                <a14:m>
+                  <m:oMath xmlns:m="http://schemas.openxmlformats.org/officeDocument/2006/math">
+                    <m:sSub>
+                      <m:sSubPr>
+                        <m:ctrlPr>
+                          <a:rPr lang="en-US" b="0" i="1" smtClean="0">
+                            <a:latin typeface="Cambria Math" panose="02040503050406030204" pitchFamily="18" charset="0"/>
+                          </a:rPr>
+                        </m:ctrlPr>
+                      </m:sSubPr>
+                      <m:e>
+                        <m:r>
+                          <a:rPr lang="en-US" b="0" i="1" smtClean="0">
+                            <a:latin typeface="Cambria Math" panose="02040503050406030204" pitchFamily="18" charset="0"/>
+                          </a:rPr>
+                          <m:t>𝑌</m:t>
+                        </m:r>
+                      </m:e>
+                      <m:sub>
+                        <m:r>
+                          <a:rPr lang="en-US" b="0" i="1" smtClean="0">
+                            <a:latin typeface="Cambria Math" panose="02040503050406030204" pitchFamily="18" charset="0"/>
+                          </a:rPr>
+                          <m:t>𝑖</m:t>
+                        </m:r>
+                      </m:sub>
+                    </m:sSub>
+                  </m:oMath>
+                </a14:m>
+                <a:r>
+                  <a:rPr lang="en-US" dirty="0"/>
+                  <a:t> (at the sub-spot level)</a:t>
+                </a:r>
+              </a:p>
+              <a:p>
+                <a:pPr marL="514350" indent="-514350">
+                  <a:buFont typeface="+mj-lt"/>
+                  <a:buAutoNum type="arabicPeriod"/>
+                </a:pPr>
+                <a:r>
+                  <a:rPr lang="en-US" dirty="0"/>
+                  <a:t>Aggregate sub-spots to generate spot-level </a:t>
+                </a:r>
+                <a14:m>
+                  <m:oMath xmlns:m="http://schemas.openxmlformats.org/officeDocument/2006/math">
+                    <m:sSubSup>
+                      <m:sSubSupPr>
+                        <m:ctrlPr>
+                          <a:rPr lang="en-US" b="0" i="1" smtClean="0">
+                            <a:latin typeface="Cambria Math" panose="02040503050406030204" pitchFamily="18" charset="0"/>
+                          </a:rPr>
+                        </m:ctrlPr>
+                      </m:sSubSupPr>
+                      <m:e>
+                        <m:r>
+                          <a:rPr lang="en-US" i="1">
+                            <a:latin typeface="Cambria Math" panose="02040503050406030204" pitchFamily="18" charset="0"/>
+                          </a:rPr>
+                          <m:t>𝑌</m:t>
+                        </m:r>
+                      </m:e>
+                      <m:sub>
+                        <m:r>
+                          <a:rPr lang="en-US" i="1">
+                            <a:latin typeface="Cambria Math" panose="02040503050406030204" pitchFamily="18" charset="0"/>
+                          </a:rPr>
+                          <m:t>𝑖</m:t>
+                        </m:r>
+                      </m:sub>
+                      <m:sup>
+                        <m:r>
+                          <a:rPr lang="en-US" b="0" i="1" smtClean="0">
+                            <a:latin typeface="Cambria Math" panose="02040503050406030204" pitchFamily="18" charset="0"/>
+                          </a:rPr>
+                          <m:t>∗</m:t>
+                        </m:r>
+                      </m:sup>
+                    </m:sSubSup>
+                  </m:oMath>
+                </a14:m>
+                <a:endParaRPr lang="en-US" dirty="0"/>
+              </a:p>
+              <a:p>
+                <a:pPr marL="514350" indent="-514350">
+                  <a:buFont typeface="+mj-lt"/>
+                  <a:buAutoNum type="arabicPeriod"/>
+                </a:pPr>
+                <a:r>
+                  <a:rPr lang="en-US" dirty="0"/>
+                  <a:t>Run deconvolution on aggregated simulated </a:t>
+                </a:r>
+                <a14:m>
+                  <m:oMath xmlns:m="http://schemas.openxmlformats.org/officeDocument/2006/math">
+                    <m:sSubSup>
+                      <m:sSubSupPr>
+                        <m:ctrlPr>
+                          <a:rPr lang="en-US" b="0" i="1" smtClean="0">
+                            <a:latin typeface="Cambria Math" panose="02040503050406030204" pitchFamily="18" charset="0"/>
+                          </a:rPr>
+                        </m:ctrlPr>
+                      </m:sSubSupPr>
+                      <m:e>
+                        <m:r>
+                          <a:rPr lang="en-US" i="1">
+                            <a:latin typeface="Cambria Math" panose="02040503050406030204" pitchFamily="18" charset="0"/>
+                          </a:rPr>
+                          <m:t>𝑌</m:t>
+                        </m:r>
+                      </m:e>
+                      <m:sub>
+                        <m:r>
+                          <a:rPr lang="en-US" i="1">
+                            <a:latin typeface="Cambria Math" panose="02040503050406030204" pitchFamily="18" charset="0"/>
+                          </a:rPr>
+                          <m:t>𝑖</m:t>
+                        </m:r>
+                      </m:sub>
+                      <m:sup>
+                        <m:r>
+                          <a:rPr lang="en-US" b="0" i="1" smtClean="0">
+                            <a:latin typeface="Cambria Math" panose="02040503050406030204" pitchFamily="18" charset="0"/>
+                          </a:rPr>
+                          <m:t>∗</m:t>
+                        </m:r>
+                      </m:sup>
+                    </m:sSubSup>
+                  </m:oMath>
+                </a14:m>
+                <a:endParaRPr lang="en-US" dirty="0"/>
+              </a:p>
+            </p:txBody>
+          </p:sp>
+        </mc:Choice>
+        <mc:Fallback>
+          <p:sp>
+            <p:nvSpPr>
+              <p:cNvPr id="3" name="Content Placeholder 2">
+                <a:extLst>
+                  <a:ext uri="{FF2B5EF4-FFF2-40B4-BE49-F238E27FC236}">
+                    <a16:creationId xmlns:a16="http://schemas.microsoft.com/office/drawing/2014/main" id="{4C77F845-D718-4F68-9FDB-CD563FFA9C0F}"/>
+                  </a:ext>
+                </a:extLst>
+              </p:cNvPr>
+              <p:cNvSpPr>
+                <a:spLocks noGrp="1" noRot="1" noChangeAspect="1" noMove="1" noResize="1" noEditPoints="1" noAdjustHandles="1" noChangeArrowheads="1" noChangeShapeType="1" noTextEdit="1"/>
+              </p:cNvSpPr>
+              <p:nvPr>
+                <p:ph idx="1"/>
+              </p:nvPr>
+            </p:nvSpPr>
+            <p:spPr>
+              <a:blipFill>
+                <a:blip r:embed="rId2"/>
+                <a:stretch>
+                  <a:fillRect l="-1217" t="-2381"/>
+                </a:stretch>
+              </a:blipFill>
+            </p:spPr>
+            <p:txBody>
+              <a:bodyPr/>
+              <a:lstStyle/>
+              <a:p>
+                <a:r>
+                  <a:rPr lang="en-US">
+                    <a:noFill/>
+                  </a:rPr>
+                  <a:t> </a:t>
+                </a:r>
+              </a:p>
+            </p:txBody>
+          </p:sp>
+        </mc:Fallback>
+      </mc:AlternateContent>
+    </p:spTree>
+    <p:extLst>
+      <p:ext uri="{BB962C8B-B14F-4D97-AF65-F5344CB8AC3E}">
+        <p14:creationId xmlns:p14="http://schemas.microsoft.com/office/powerpoint/2010/main" val="3764328592"/>
       </p:ext>
     </p:extLst>
   </p:cSld>

</xml_diff>